<commit_message>
I made changes and merged two slides from Cory
</commit_message>
<xml_diff>
--- a/Presentations/SIMF_OMG_201709.pptx
+++ b/Presentations/SIMF_OMG_201709.pptx
@@ -121,7 +121,7 @@
   </p:defaultTextStyle>
   <p:extLst>
     <p:ext uri="{EFAFB233-063F-42B5-8137-9DF3F51BA10A}">
-      <p15:sldGuideLst xmlns:p15="http://schemas.microsoft.com/office/powerpoint/2012/main">
+      <p15:sldGuideLst xmlns:p15="http://schemas.microsoft.com/office/powerpoint/2012/main" xmlns="">
         <p15:guide id="1" orient="horz" pos="2160">
           <p15:clr>
             <a:srgbClr val="A4A3A4"/>
@@ -135,7 +135,7 @@
       </p15:sldGuideLst>
     </p:ext>
     <p:ext uri="{2D200454-40CA-4A62-9FC3-DE9A4176ACB9}">
-      <p15:notesGuideLst xmlns:p15="http://schemas.microsoft.com/office/powerpoint/2012/main"/>
+      <p15:notesGuideLst xmlns:p15="http://schemas.microsoft.com/office/powerpoint/2012/main" xmlns=""/>
     </p:ext>
   </p:extLst>
 </p:presentation>
@@ -223,7 +223,7 @@
           <a:p>
             <a:fld id="{38E3837F-7B40-4B98-90A9-C161BB7B8FD2}" type="datetimeFigureOut">
               <a:rPr lang="en-US" smtClean="0"/>
-              <a:t>9/27/2017</a:t>
+              <a:t>9/27/17</a:t>
             </a:fld>
             <a:endParaRPr lang="en-US"/>
           </a:p>
@@ -388,7 +388,7 @@
           <a:p>
             <a:fld id="{C40E5A84-7D87-452D-8FE3-23F521AC3943}" type="datetimeFigureOut">
               <a:rPr lang="en-US" smtClean="0"/>
-              <a:t>9/27/2017</a:t>
+              <a:t>9/27/17</a:t>
             </a:fld>
             <a:endParaRPr lang="en-US"/>
           </a:p>
@@ -4842,7 +4842,7 @@
           <a:noFill/>
           <a:extLst>
             <a:ext uri="{909E8E84-426E-40dd-AFC4-6F175D3DCCD1}">
-              <a14:hiddenFill xmlns:a14="http://schemas.microsoft.com/office/drawing/2010/main" xmlns="">
+              <a14:hiddenFill xmlns:a14="http://schemas.microsoft.com/office/drawing/2010/main">
                 <a:solidFill>
                   <a:srgbClr val="FFFFFF"/>
                 </a:solidFill>
@@ -4943,14 +4943,14 @@
           <a:effectLst/>
           <a:extLst>
             <a:ext uri="{909E8E84-426E-40dd-AFC4-6F175D3DCCD1}">
-              <a14:hiddenFill xmlns:a14="http://schemas.microsoft.com/office/drawing/2010/main" xmlns="">
+              <a14:hiddenFill xmlns:a14="http://schemas.microsoft.com/office/drawing/2010/main">
                 <a:solidFill>
                   <a:schemeClr val="accent1"/>
                 </a:solidFill>
               </a14:hiddenFill>
             </a:ext>
             <a:ext uri="{91240B29-F687-4f45-9708-019B960494DF}">
-              <a14:hiddenLine xmlns:a14="http://schemas.microsoft.com/office/drawing/2010/main" xmlns="" w="9525">
+              <a14:hiddenLine xmlns:a14="http://schemas.microsoft.com/office/drawing/2010/main" w="9525">
                 <a:solidFill>
                   <a:schemeClr val="tx1"/>
                 </a:solidFill>
@@ -4960,7 +4960,7 @@
               </a14:hiddenLine>
             </a:ext>
             <a:ext uri="{AF507438-7753-43e0-B8FC-AC1667EBCBE1}">
-              <a14:hiddenEffects xmlns:a14="http://schemas.microsoft.com/office/drawing/2010/main" xmlns="">
+              <a14:hiddenEffects xmlns:a14="http://schemas.microsoft.com/office/drawing/2010/main">
                 <a:effectLst>
                   <a:outerShdw dist="35921" dir="2700000" algn="ctr" rotWithShape="0">
                     <a:schemeClr val="bg2"/>
@@ -5005,6 +5005,13 @@
   <p:clrMapOvr>
     <a:masterClrMapping/>
   </p:clrMapOvr>
+  <p:timing>
+    <p:tnLst>
+      <p:par>
+        <p:cTn xmlns:p14="http://schemas.microsoft.com/office/powerpoint/2010/main" id="1" dur="indefinite" restart="never" nodeType="tmRoot"/>
+      </p:par>
+    </p:tnLst>
+  </p:timing>
 </p:sld>
 </file>
 
@@ -5144,6 +5151,13 @@
   <p:clrMapOvr>
     <a:masterClrMapping/>
   </p:clrMapOvr>
+  <p:timing>
+    <p:tnLst>
+      <p:par>
+        <p:cTn xmlns:p14="http://schemas.microsoft.com/office/powerpoint/2010/main" id="1" dur="indefinite" restart="never" nodeType="tmRoot"/>
+      </p:par>
+    </p:tnLst>
+  </p:timing>
 </p:sld>
 </file>
 
@@ -5169,7 +5183,7 @@
           <p:cNvPr id="2" name="Content Placeholder 1">
             <a:extLst>
               <a:ext uri="{FF2B5EF4-FFF2-40B4-BE49-F238E27FC236}">
-                <a16:creationId xmlns:a16="http://schemas.microsoft.com/office/drawing/2014/main" id="{826812CC-2C5F-418D-BAD7-32BB6856897B}"/>
+                <a16:creationId xmlns:a16="http://schemas.microsoft.com/office/drawing/2014/main" xmlns="" id="{826812CC-2C5F-418D-BAD7-32BB6856897B}"/>
               </a:ext>
             </a:extLst>
           </p:cNvPr>
@@ -5296,7 +5310,7 @@
           <p:cNvPr id="3" name="Date Placeholder 2">
             <a:extLst>
               <a:ext uri="{FF2B5EF4-FFF2-40B4-BE49-F238E27FC236}">
-                <a16:creationId xmlns:a16="http://schemas.microsoft.com/office/drawing/2014/main" id="{3DC30237-7DD9-4047-BA30-558311A41567}"/>
+                <a16:creationId xmlns:a16="http://schemas.microsoft.com/office/drawing/2014/main" xmlns="" id="{3DC30237-7DD9-4047-BA30-558311A41567}"/>
               </a:ext>
             </a:extLst>
           </p:cNvPr>
@@ -5325,7 +5339,7 @@
           <p:cNvPr id="4" name="Slide Number Placeholder 3">
             <a:extLst>
               <a:ext uri="{FF2B5EF4-FFF2-40B4-BE49-F238E27FC236}">
-                <a16:creationId xmlns:a16="http://schemas.microsoft.com/office/drawing/2014/main" id="{F22FC263-85E1-4F53-B4B0-B5B6246D988F}"/>
+                <a16:creationId xmlns:a16="http://schemas.microsoft.com/office/drawing/2014/main" xmlns="" id="{F22FC263-85E1-4F53-B4B0-B5B6246D988F}"/>
               </a:ext>
             </a:extLst>
           </p:cNvPr>
@@ -5354,7 +5368,7 @@
           <p:cNvPr id="5" name="Footer Placeholder 4">
             <a:extLst>
               <a:ext uri="{FF2B5EF4-FFF2-40B4-BE49-F238E27FC236}">
-                <a16:creationId xmlns:a16="http://schemas.microsoft.com/office/drawing/2014/main" id="{50446F51-4B75-49E0-A1D8-482EEFC1D0ED}"/>
+                <a16:creationId xmlns:a16="http://schemas.microsoft.com/office/drawing/2014/main" xmlns="" id="{50446F51-4B75-49E0-A1D8-482EEFC1D0ED}"/>
               </a:ext>
             </a:extLst>
           </p:cNvPr>
@@ -5379,7 +5393,7 @@
           <p:cNvPr id="6" name="Title 5">
             <a:extLst>
               <a:ext uri="{FF2B5EF4-FFF2-40B4-BE49-F238E27FC236}">
-                <a16:creationId xmlns:a16="http://schemas.microsoft.com/office/drawing/2014/main" id="{9DD2DC20-A4D7-4D07-8B5C-0D2C544F7BD7}"/>
+                <a16:creationId xmlns:a16="http://schemas.microsoft.com/office/drawing/2014/main" xmlns="" id="{9DD2DC20-A4D7-4D07-8B5C-0D2C544F7BD7}"/>
               </a:ext>
             </a:extLst>
           </p:cNvPr>
@@ -5412,6 +5426,13 @@
   <p:clrMapOvr>
     <a:masterClrMapping/>
   </p:clrMapOvr>
+  <p:timing>
+    <p:tnLst>
+      <p:par>
+        <p:cTn xmlns:p14="http://schemas.microsoft.com/office/powerpoint/2010/main" id="1" dur="indefinite" restart="never" nodeType="tmRoot"/>
+      </p:par>
+    </p:tnLst>
+  </p:timing>
 </p:sld>
 </file>
 
@@ -5437,7 +5458,7 @@
           <p:cNvPr id="3" name="Date Placeholder 2">
             <a:extLst>
               <a:ext uri="{FF2B5EF4-FFF2-40B4-BE49-F238E27FC236}">
-                <a16:creationId xmlns:a16="http://schemas.microsoft.com/office/drawing/2014/main" id="{669EEB1C-74A0-4205-9825-7941089BF4F3}"/>
+                <a16:creationId xmlns:a16="http://schemas.microsoft.com/office/drawing/2014/main" xmlns="" id="{669EEB1C-74A0-4205-9825-7941089BF4F3}"/>
               </a:ext>
             </a:extLst>
           </p:cNvPr>
@@ -5466,7 +5487,7 @@
           <p:cNvPr id="4" name="Slide Number Placeholder 3">
             <a:extLst>
               <a:ext uri="{FF2B5EF4-FFF2-40B4-BE49-F238E27FC236}">
-                <a16:creationId xmlns:a16="http://schemas.microsoft.com/office/drawing/2014/main" id="{ABB9F9CD-E4C9-4B17-9204-6DD1ACD051E9}"/>
+                <a16:creationId xmlns:a16="http://schemas.microsoft.com/office/drawing/2014/main" xmlns="" id="{ABB9F9CD-E4C9-4B17-9204-6DD1ACD051E9}"/>
               </a:ext>
             </a:extLst>
           </p:cNvPr>
@@ -5495,7 +5516,7 @@
           <p:cNvPr id="5" name="Footer Placeholder 4">
             <a:extLst>
               <a:ext uri="{FF2B5EF4-FFF2-40B4-BE49-F238E27FC236}">
-                <a16:creationId xmlns:a16="http://schemas.microsoft.com/office/drawing/2014/main" id="{634A4081-D9D4-4522-8276-7D1C460426EB}"/>
+                <a16:creationId xmlns:a16="http://schemas.microsoft.com/office/drawing/2014/main" xmlns="" id="{634A4081-D9D4-4522-8276-7D1C460426EB}"/>
               </a:ext>
             </a:extLst>
           </p:cNvPr>
@@ -5520,7 +5541,7 @@
           <p:cNvPr id="7" name="Title 6">
             <a:extLst>
               <a:ext uri="{FF2B5EF4-FFF2-40B4-BE49-F238E27FC236}">
-                <a16:creationId xmlns:a16="http://schemas.microsoft.com/office/drawing/2014/main" id="{C2AC93AB-609A-4CD3-9A22-0434D1A22D2E}"/>
+                <a16:creationId xmlns:a16="http://schemas.microsoft.com/office/drawing/2014/main" xmlns="" id="{C2AC93AB-609A-4CD3-9A22-0434D1A22D2E}"/>
               </a:ext>
             </a:extLst>
           </p:cNvPr>
@@ -5555,7 +5576,7 @@
           <p:cNvPr id="8" name="Flowchart: Magnetic Disk 7">
             <a:extLst>
               <a:ext uri="{FF2B5EF4-FFF2-40B4-BE49-F238E27FC236}">
-                <a16:creationId xmlns:a16="http://schemas.microsoft.com/office/drawing/2014/main" id="{20F6F7BB-6C07-4E1F-86B0-934C34DFB452}"/>
+                <a16:creationId xmlns:a16="http://schemas.microsoft.com/office/drawing/2014/main" xmlns="" id="{20F6F7BB-6C07-4E1F-86B0-934C34DFB452}"/>
               </a:ext>
             </a:extLst>
           </p:cNvPr>
@@ -5611,7 +5632,7 @@
           <p:cNvPr id="9" name="Flowchart: Multidocument 8">
             <a:extLst>
               <a:ext uri="{FF2B5EF4-FFF2-40B4-BE49-F238E27FC236}">
-                <a16:creationId xmlns:a16="http://schemas.microsoft.com/office/drawing/2014/main" id="{D1FD1D33-CD8B-4283-A33E-D905D91348A2}"/>
+                <a16:creationId xmlns:a16="http://schemas.microsoft.com/office/drawing/2014/main" xmlns="" id="{D1FD1D33-CD8B-4283-A33E-D905D91348A2}"/>
               </a:ext>
             </a:extLst>
           </p:cNvPr>
@@ -5670,7 +5691,7 @@
           <p:cNvPr id="10" name="Flowchart: Process 9">
             <a:extLst>
               <a:ext uri="{FF2B5EF4-FFF2-40B4-BE49-F238E27FC236}">
-                <a16:creationId xmlns:a16="http://schemas.microsoft.com/office/drawing/2014/main" id="{6659766A-E52A-4C3C-BA53-D045F1923A8A}"/>
+                <a16:creationId xmlns:a16="http://schemas.microsoft.com/office/drawing/2014/main" xmlns="" id="{6659766A-E52A-4C3C-BA53-D045F1923A8A}"/>
               </a:ext>
             </a:extLst>
           </p:cNvPr>
@@ -5722,7 +5743,7 @@
           <p:cNvPr id="11" name="Flowchart: Process 10">
             <a:extLst>
               <a:ext uri="{FF2B5EF4-FFF2-40B4-BE49-F238E27FC236}">
-                <a16:creationId xmlns:a16="http://schemas.microsoft.com/office/drawing/2014/main" id="{1B63F041-65AF-4B1E-8805-80CE77AF3AAD}"/>
+                <a16:creationId xmlns:a16="http://schemas.microsoft.com/office/drawing/2014/main" xmlns="" id="{1B63F041-65AF-4B1E-8805-80CE77AF3AAD}"/>
               </a:ext>
             </a:extLst>
           </p:cNvPr>
@@ -5789,7 +5810,7 @@
           <p:cNvPr id="12" name="Flowchart: Process 11">
             <a:extLst>
               <a:ext uri="{FF2B5EF4-FFF2-40B4-BE49-F238E27FC236}">
-                <a16:creationId xmlns:a16="http://schemas.microsoft.com/office/drawing/2014/main" id="{2287463B-472F-4FC5-A122-C6F9D24A5E2F}"/>
+                <a16:creationId xmlns:a16="http://schemas.microsoft.com/office/drawing/2014/main" xmlns="" id="{2287463B-472F-4FC5-A122-C6F9D24A5E2F}"/>
               </a:ext>
             </a:extLst>
           </p:cNvPr>
@@ -5841,7 +5862,7 @@
           <p:cNvPr id="13" name="Flowchart: Process 12">
             <a:extLst>
               <a:ext uri="{FF2B5EF4-FFF2-40B4-BE49-F238E27FC236}">
-                <a16:creationId xmlns:a16="http://schemas.microsoft.com/office/drawing/2014/main" id="{520B1F08-5404-425D-A3C5-A12D111F680D}"/>
+                <a16:creationId xmlns:a16="http://schemas.microsoft.com/office/drawing/2014/main" xmlns="" id="{520B1F08-5404-425D-A3C5-A12D111F680D}"/>
               </a:ext>
             </a:extLst>
           </p:cNvPr>
@@ -5908,7 +5929,7 @@
           <p:cNvPr id="14" name="Flowchart: Process 13">
             <a:extLst>
               <a:ext uri="{FF2B5EF4-FFF2-40B4-BE49-F238E27FC236}">
-                <a16:creationId xmlns:a16="http://schemas.microsoft.com/office/drawing/2014/main" id="{8BBFFD98-C357-472A-A09A-221BB5513D18}"/>
+                <a16:creationId xmlns:a16="http://schemas.microsoft.com/office/drawing/2014/main" xmlns="" id="{8BBFFD98-C357-472A-A09A-221BB5513D18}"/>
               </a:ext>
             </a:extLst>
           </p:cNvPr>
@@ -5975,7 +5996,7 @@
           <p:cNvPr id="15" name="Arrow: Curved Left 14">
             <a:extLst>
               <a:ext uri="{FF2B5EF4-FFF2-40B4-BE49-F238E27FC236}">
-                <a16:creationId xmlns:a16="http://schemas.microsoft.com/office/drawing/2014/main" id="{A77833B1-9B22-45AC-B182-C2BC059E7358}"/>
+                <a16:creationId xmlns:a16="http://schemas.microsoft.com/office/drawing/2014/main" xmlns="" id="{A77833B1-9B22-45AC-B182-C2BC059E7358}"/>
               </a:ext>
             </a:extLst>
           </p:cNvPr>
@@ -6028,7 +6049,7 @@
           <p:cNvPr id="17" name="Arrow: Right 16">
             <a:extLst>
               <a:ext uri="{FF2B5EF4-FFF2-40B4-BE49-F238E27FC236}">
-                <a16:creationId xmlns:a16="http://schemas.microsoft.com/office/drawing/2014/main" id="{F0E2EFBB-98D4-42A3-8AE3-DDB0EBDA9F0D}"/>
+                <a16:creationId xmlns:a16="http://schemas.microsoft.com/office/drawing/2014/main" xmlns="" id="{F0E2EFBB-98D4-42A3-8AE3-DDB0EBDA9F0D}"/>
               </a:ext>
             </a:extLst>
           </p:cNvPr>
@@ -6077,7 +6098,7 @@
           <p:cNvPr id="18" name="Arrow: Down 17">
             <a:extLst>
               <a:ext uri="{FF2B5EF4-FFF2-40B4-BE49-F238E27FC236}">
-                <a16:creationId xmlns:a16="http://schemas.microsoft.com/office/drawing/2014/main" id="{4CBAADD2-265A-409E-97DB-8EDC26558C1F}"/>
+                <a16:creationId xmlns:a16="http://schemas.microsoft.com/office/drawing/2014/main" xmlns="" id="{4CBAADD2-265A-409E-97DB-8EDC26558C1F}"/>
               </a:ext>
             </a:extLst>
           </p:cNvPr>
@@ -6126,7 +6147,7 @@
           <p:cNvPr id="19" name="Arrow: Up-Down 18">
             <a:extLst>
               <a:ext uri="{FF2B5EF4-FFF2-40B4-BE49-F238E27FC236}">
-                <a16:creationId xmlns:a16="http://schemas.microsoft.com/office/drawing/2014/main" id="{8BF97E70-A161-4934-A6F2-8034357E6C04}"/>
+                <a16:creationId xmlns:a16="http://schemas.microsoft.com/office/drawing/2014/main" xmlns="" id="{8BF97E70-A161-4934-A6F2-8034357E6C04}"/>
               </a:ext>
             </a:extLst>
           </p:cNvPr>
@@ -6179,7 +6200,7 @@
           <p:cNvPr id="20" name="Flowchart: Process 19">
             <a:extLst>
               <a:ext uri="{FF2B5EF4-FFF2-40B4-BE49-F238E27FC236}">
-                <a16:creationId xmlns:a16="http://schemas.microsoft.com/office/drawing/2014/main" id="{5FD09A0D-EB2E-442E-97BC-478086584810}"/>
+                <a16:creationId xmlns:a16="http://schemas.microsoft.com/office/drawing/2014/main" xmlns="" id="{5FD09A0D-EB2E-442E-97BC-478086584810}"/>
               </a:ext>
             </a:extLst>
           </p:cNvPr>
@@ -6235,7 +6256,7 @@
           <p:cNvPr id="22" name="Flowchart: Process 21">
             <a:extLst>
               <a:ext uri="{FF2B5EF4-FFF2-40B4-BE49-F238E27FC236}">
-                <a16:creationId xmlns:a16="http://schemas.microsoft.com/office/drawing/2014/main" id="{9BF60AA5-D0AE-4D42-9084-75157F4E0D6F}"/>
+                <a16:creationId xmlns:a16="http://schemas.microsoft.com/office/drawing/2014/main" xmlns="" id="{9BF60AA5-D0AE-4D42-9084-75157F4E0D6F}"/>
               </a:ext>
             </a:extLst>
           </p:cNvPr>
@@ -6292,7 +6313,7 @@
           <p:cNvPr id="23" name="Arrow: Up-Down 22">
             <a:extLst>
               <a:ext uri="{FF2B5EF4-FFF2-40B4-BE49-F238E27FC236}">
-                <a16:creationId xmlns:a16="http://schemas.microsoft.com/office/drawing/2014/main" id="{BE9C6C1F-8369-48C5-A50B-E5FB826D8048}"/>
+                <a16:creationId xmlns:a16="http://schemas.microsoft.com/office/drawing/2014/main" xmlns="" id="{BE9C6C1F-8369-48C5-A50B-E5FB826D8048}"/>
               </a:ext>
             </a:extLst>
           </p:cNvPr>
@@ -6339,7 +6360,7 @@
           <p:cNvPr id="24" name="Flowchart: Process 23">
             <a:extLst>
               <a:ext uri="{FF2B5EF4-FFF2-40B4-BE49-F238E27FC236}">
-                <a16:creationId xmlns:a16="http://schemas.microsoft.com/office/drawing/2014/main" id="{BDAE364C-550D-4749-A67B-D290FD54BF5C}"/>
+                <a16:creationId xmlns:a16="http://schemas.microsoft.com/office/drawing/2014/main" xmlns="" id="{BDAE364C-550D-4749-A67B-D290FD54BF5C}"/>
               </a:ext>
             </a:extLst>
           </p:cNvPr>
@@ -6408,7 +6429,7 @@
           <p:cNvPr id="25" name="Flowchart: Process 24">
             <a:extLst>
               <a:ext uri="{FF2B5EF4-FFF2-40B4-BE49-F238E27FC236}">
-                <a16:creationId xmlns:a16="http://schemas.microsoft.com/office/drawing/2014/main" id="{13097914-15B4-41F4-8258-4A18F7B0ABFA}"/>
+                <a16:creationId xmlns:a16="http://schemas.microsoft.com/office/drawing/2014/main" xmlns="" id="{13097914-15B4-41F4-8258-4A18F7B0ABFA}"/>
               </a:ext>
             </a:extLst>
           </p:cNvPr>
@@ -6477,7 +6498,7 @@
           <p:cNvPr id="26" name="Flowchart: Process 25">
             <a:extLst>
               <a:ext uri="{FF2B5EF4-FFF2-40B4-BE49-F238E27FC236}">
-                <a16:creationId xmlns:a16="http://schemas.microsoft.com/office/drawing/2014/main" id="{33DDDBB4-3FD4-4014-9790-B8ADEAB05CE2}"/>
+                <a16:creationId xmlns:a16="http://schemas.microsoft.com/office/drawing/2014/main" xmlns="" id="{33DDDBB4-3FD4-4014-9790-B8ADEAB05CE2}"/>
               </a:ext>
             </a:extLst>
           </p:cNvPr>
@@ -6546,7 +6567,7 @@
           <p:cNvPr id="27" name="Flowchart: Process 26">
             <a:extLst>
               <a:ext uri="{FF2B5EF4-FFF2-40B4-BE49-F238E27FC236}">
-                <a16:creationId xmlns:a16="http://schemas.microsoft.com/office/drawing/2014/main" id="{14A33B4F-6407-45C9-ACBA-400FE15AA76D}"/>
+                <a16:creationId xmlns:a16="http://schemas.microsoft.com/office/drawing/2014/main" xmlns="" id="{14A33B4F-6407-45C9-ACBA-400FE15AA76D}"/>
               </a:ext>
             </a:extLst>
           </p:cNvPr>
@@ -6598,7 +6619,7 @@
           <p:cNvPr id="28" name="Arrow: Right 27">
             <a:extLst>
               <a:ext uri="{FF2B5EF4-FFF2-40B4-BE49-F238E27FC236}">
-                <a16:creationId xmlns:a16="http://schemas.microsoft.com/office/drawing/2014/main" id="{03821916-3A08-4502-A86B-F2D131E87F09}"/>
+                <a16:creationId xmlns:a16="http://schemas.microsoft.com/office/drawing/2014/main" xmlns="" id="{03821916-3A08-4502-A86B-F2D131E87F09}"/>
               </a:ext>
             </a:extLst>
           </p:cNvPr>
@@ -6647,7 +6668,7 @@
           <p:cNvPr id="29" name="Speech Bubble: Rectangle with Corners Rounded 28">
             <a:extLst>
               <a:ext uri="{FF2B5EF4-FFF2-40B4-BE49-F238E27FC236}">
-                <a16:creationId xmlns:a16="http://schemas.microsoft.com/office/drawing/2014/main" id="{69436F79-2E9D-4BC0-AF5B-DD404892B7BF}"/>
+                <a16:creationId xmlns:a16="http://schemas.microsoft.com/office/drawing/2014/main" xmlns="" id="{69436F79-2E9D-4BC0-AF5B-DD404892B7BF}"/>
               </a:ext>
             </a:extLst>
           </p:cNvPr>
@@ -6700,7 +6721,7 @@
           <p:cNvPr id="30" name="Flowchart: Process 29">
             <a:extLst>
               <a:ext uri="{FF2B5EF4-FFF2-40B4-BE49-F238E27FC236}">
-                <a16:creationId xmlns:a16="http://schemas.microsoft.com/office/drawing/2014/main" id="{CD4D1923-1C24-40C1-A1E4-66783108815C}"/>
+                <a16:creationId xmlns:a16="http://schemas.microsoft.com/office/drawing/2014/main" xmlns="" id="{CD4D1923-1C24-40C1-A1E4-66783108815C}"/>
               </a:ext>
             </a:extLst>
           </p:cNvPr>
@@ -6769,7 +6790,7 @@
           <p:cNvPr id="31" name="TextBox 30">
             <a:extLst>
               <a:ext uri="{FF2B5EF4-FFF2-40B4-BE49-F238E27FC236}">
-                <a16:creationId xmlns:a16="http://schemas.microsoft.com/office/drawing/2014/main" id="{067CE61C-5D9E-4E96-B09F-0E2FFC8DD3C1}"/>
+                <a16:creationId xmlns:a16="http://schemas.microsoft.com/office/drawing/2014/main" xmlns="" id="{067CE61C-5D9E-4E96-B09F-0E2FFC8DD3C1}"/>
               </a:ext>
             </a:extLst>
           </p:cNvPr>
@@ -6813,7 +6834,7 @@
           <p:cNvPr id="32" name="Rectangle 31">
             <a:extLst>
               <a:ext uri="{FF2B5EF4-FFF2-40B4-BE49-F238E27FC236}">
-                <a16:creationId xmlns:a16="http://schemas.microsoft.com/office/drawing/2014/main" id="{5D68C0CC-9763-4709-91FE-9A624BE402A9}"/>
+                <a16:creationId xmlns:a16="http://schemas.microsoft.com/office/drawing/2014/main" xmlns="" id="{5D68C0CC-9763-4709-91FE-9A624BE402A9}"/>
               </a:ext>
             </a:extLst>
           </p:cNvPr>
@@ -6862,7 +6883,7 @@
           <p:cNvPr id="33" name="Arrow: Bent 32">
             <a:extLst>
               <a:ext uri="{FF2B5EF4-FFF2-40B4-BE49-F238E27FC236}">
-                <a16:creationId xmlns:a16="http://schemas.microsoft.com/office/drawing/2014/main" id="{49E21620-DAD3-47A1-95E3-4A8C5A2390F5}"/>
+                <a16:creationId xmlns:a16="http://schemas.microsoft.com/office/drawing/2014/main" xmlns="" id="{49E21620-DAD3-47A1-95E3-4A8C5A2390F5}"/>
               </a:ext>
             </a:extLst>
           </p:cNvPr>
@@ -6912,7 +6933,7 @@
           <p:cNvPr id="34" name="Arrow: Bent 33">
             <a:extLst>
               <a:ext uri="{FF2B5EF4-FFF2-40B4-BE49-F238E27FC236}">
-                <a16:creationId xmlns:a16="http://schemas.microsoft.com/office/drawing/2014/main" id="{87776924-A6E6-4235-96AE-212195700A02}"/>
+                <a16:creationId xmlns:a16="http://schemas.microsoft.com/office/drawing/2014/main" xmlns="" id="{87776924-A6E6-4235-96AE-212195700A02}"/>
               </a:ext>
             </a:extLst>
           </p:cNvPr>
@@ -6967,7 +6988,7 @@
           <p:cNvPr id="2" name="Speech Bubble: Rectangle with Corners Rounded 1">
             <a:extLst>
               <a:ext uri="{FF2B5EF4-FFF2-40B4-BE49-F238E27FC236}">
-                <a16:creationId xmlns:a16="http://schemas.microsoft.com/office/drawing/2014/main" id="{8E73117E-8633-4F73-A5E1-A7B0745449B6}"/>
+                <a16:creationId xmlns:a16="http://schemas.microsoft.com/office/drawing/2014/main" xmlns="" id="{8E73117E-8633-4F73-A5E1-A7B0745449B6}"/>
               </a:ext>
             </a:extLst>
           </p:cNvPr>
@@ -7020,7 +7041,7 @@
           <p:cNvPr id="21" name="Picture 20">
             <a:extLst>
               <a:ext uri="{FF2B5EF4-FFF2-40B4-BE49-F238E27FC236}">
-                <a16:creationId xmlns:a16="http://schemas.microsoft.com/office/drawing/2014/main" id="{36C04CE6-C794-4ED1-B6D7-DC477516E482}"/>
+                <a16:creationId xmlns:a16="http://schemas.microsoft.com/office/drawing/2014/main" xmlns="" id="{36C04CE6-C794-4ED1-B6D7-DC477516E482}"/>
               </a:ext>
             </a:extLst>
           </p:cNvPr>
@@ -7050,7 +7071,7 @@
           <p:cNvPr id="38" name="Flowchart: Process 37">
             <a:extLst>
               <a:ext uri="{FF2B5EF4-FFF2-40B4-BE49-F238E27FC236}">
-                <a16:creationId xmlns:a16="http://schemas.microsoft.com/office/drawing/2014/main" id="{753C76A3-8872-418B-B58C-CEE7E67EA83A}"/>
+                <a16:creationId xmlns:a16="http://schemas.microsoft.com/office/drawing/2014/main" xmlns="" id="{753C76A3-8872-418B-B58C-CEE7E67EA83A}"/>
               </a:ext>
             </a:extLst>
           </p:cNvPr>
@@ -7124,6 +7145,13 @@
   <p:clrMapOvr>
     <a:masterClrMapping/>
   </p:clrMapOvr>
+  <p:timing>
+    <p:tnLst>
+      <p:par>
+        <p:cTn xmlns:p14="http://schemas.microsoft.com/office/powerpoint/2010/main" id="1" dur="indefinite" restart="never" nodeType="tmRoot"/>
+      </p:par>
+    </p:tnLst>
+  </p:timing>
 </p:sld>
 </file>
 
@@ -7288,14 +7316,14 @@
               </a:ln>
               <a:effectLst/>
               <a:extLst>
-                <a:ext uri="{909E8E84-426E-40DD-AFC4-6F175D3DCCD1}">
+                <a:ext uri="{909E8E84-426E-40dd-AFC4-6F175D3DCCD1}">
                   <a14:hiddenFill xmlns:a14="http://schemas.microsoft.com/office/drawing/2010/main">
                     <a:solidFill>
                       <a:schemeClr val="accent1"/>
                     </a:solidFill>
                   </a14:hiddenFill>
                 </a:ext>
-                <a:ext uri="{91240B29-F687-4F45-9708-019B960494DF}">
+                <a:ext uri="{91240B29-F687-4f45-9708-019B960494DF}">
                   <a14:hiddenLine xmlns:a14="http://schemas.microsoft.com/office/drawing/2010/main" w="9525">
                     <a:solidFill>
                       <a:schemeClr val="tx1"/>
@@ -7305,7 +7333,7 @@
                     <a:tailEnd/>
                   </a14:hiddenLine>
                 </a:ext>
-                <a:ext uri="{AF507438-7753-43E0-B8FC-AC1667EBCBE1}">
+                <a:ext uri="{AF507438-7753-43e0-B8FC-AC1667EBCBE1}">
                   <a14:hiddenEffects xmlns:a14="http://schemas.microsoft.com/office/drawing/2010/main">
                     <a:effectLst>
                       <a:outerShdw dist="35921" dir="2700000" algn="ctr" rotWithShape="0">
@@ -7352,14 +7380,14 @@
               </a:ln>
               <a:effectLst/>
               <a:extLst>
-                <a:ext uri="{909E8E84-426E-40DD-AFC4-6F175D3DCCD1}">
+                <a:ext uri="{909E8E84-426E-40dd-AFC4-6F175D3DCCD1}">
                   <a14:hiddenFill xmlns:a14="http://schemas.microsoft.com/office/drawing/2010/main">
                     <a:solidFill>
                       <a:schemeClr val="accent1"/>
                     </a:solidFill>
                   </a14:hiddenFill>
                 </a:ext>
-                <a:ext uri="{91240B29-F687-4F45-9708-019B960494DF}">
+                <a:ext uri="{91240B29-F687-4f45-9708-019B960494DF}">
                   <a14:hiddenLine xmlns:a14="http://schemas.microsoft.com/office/drawing/2010/main" w="9525">
                     <a:solidFill>
                       <a:schemeClr val="tx1"/>
@@ -7369,7 +7397,7 @@
                     <a:tailEnd/>
                   </a14:hiddenLine>
                 </a:ext>
-                <a:ext uri="{AF507438-7753-43E0-B8FC-AC1667EBCBE1}">
+                <a:ext uri="{AF507438-7753-43e0-B8FC-AC1667EBCBE1}">
                   <a14:hiddenEffects xmlns:a14="http://schemas.microsoft.com/office/drawing/2010/main">
                     <a:effectLst>
                       <a:outerShdw dist="35921" dir="2700000" algn="ctr" rotWithShape="0">
@@ -7488,7 +7516,7 @@
         </p:spPr>
         <p:txBody>
           <a:bodyPr>
-            <a:normAutofit fontScale="85000" lnSpcReduction="10000"/>
+            <a:normAutofit fontScale="92500" lnSpcReduction="20000"/>
           </a:bodyPr>
           <a:lstStyle/>
           <a:p>
@@ -8192,7 +8220,7 @@
     </p:spTree>
     <p:extLst>
       <p:ext uri="{BB962C8B-B14F-4D97-AF65-F5344CB8AC3E}">
-        <p14:creationId xmlns:p14="http://schemas.microsoft.com/office/powerpoint/2010/main" val="2391047842"/>
+        <p14:creationId xmlns:p14="http://schemas.microsoft.com/office/powerpoint/2010/main" val="121414076"/>
       </p:ext>
     </p:extLst>
   </p:cSld>
@@ -8202,7 +8230,7 @@
   <p:timing>
     <p:tnLst>
       <p:par>
-        <p:cTn id="1" dur="indefinite" restart="never" nodeType="tmRoot">
+        <p:cTn xmlns:p14="http://schemas.microsoft.com/office/powerpoint/2010/main" id="1" dur="indefinite" restart="never" nodeType="tmRoot">
           <p:childTnLst>
             <p:seq concurrent="1" nextAc="seek">
               <p:cTn id="2" dur="indefinite" nodeType="mainSeq">
@@ -8635,13 +8663,20 @@
     </p:spTree>
     <p:extLst>
       <p:ext uri="{BB962C8B-B14F-4D97-AF65-F5344CB8AC3E}">
-        <p14:creationId xmlns:p14="http://schemas.microsoft.com/office/powerpoint/2010/main" val="3836568017"/>
+        <p14:creationId xmlns:p14="http://schemas.microsoft.com/office/powerpoint/2010/main" val="4145318216"/>
       </p:ext>
     </p:extLst>
   </p:cSld>
   <p:clrMapOvr>
     <a:masterClrMapping/>
   </p:clrMapOvr>
+  <p:timing>
+    <p:tnLst>
+      <p:par>
+        <p:cTn xmlns:p14="http://schemas.microsoft.com/office/powerpoint/2010/main" id="1" dur="indefinite" restart="never" nodeType="tmRoot"/>
+      </p:par>
+    </p:tnLst>
+  </p:timing>
 </p:sld>
 </file>
 
@@ -8871,6 +8906,13 @@
   <p:clrMapOvr>
     <a:masterClrMapping/>
   </p:clrMapOvr>
+  <p:timing>
+    <p:tnLst>
+      <p:par>
+        <p:cTn xmlns:p14="http://schemas.microsoft.com/office/powerpoint/2010/main" id="1" dur="indefinite" restart="never" nodeType="tmRoot"/>
+      </p:par>
+    </p:tnLst>
+  </p:timing>
 </p:sld>
 </file>
 
@@ -8922,7 +8964,15 @@
             </a:pPr>
             <a:r>
               <a:rPr lang="en-US" dirty="0"/>
-              <a:t>Provides capability for domain concept modeling</a:t>
+              <a:t>Provides capability for </a:t>
+            </a:r>
+            <a:r>
+              <a:rPr lang="en-US" dirty="0" smtClean="0"/>
+              <a:t>visual domain </a:t>
+            </a:r>
+            <a:r>
+              <a:rPr lang="en-US" dirty="0"/>
+              <a:t>concept modeling</a:t>
             </a:r>
           </a:p>
           <a:p>
@@ -8932,7 +8982,27 @@
             </a:pPr>
             <a:r>
               <a:rPr lang="en-US" dirty="0"/>
-              <a:t>Provides capability for diagram and natural-language glossary validation with business SMEs</a:t>
+              <a:t>Provides capability for </a:t>
+            </a:r>
+            <a:r>
+              <a:rPr lang="en-US" dirty="0"/>
+              <a:t>validation with business </a:t>
+            </a:r>
+            <a:r>
+              <a:rPr lang="en-US" dirty="0" smtClean="0"/>
+              <a:t>SMEs of </a:t>
+            </a:r>
+            <a:r>
+              <a:rPr lang="en-US" dirty="0" smtClean="0"/>
+              <a:t>diagrams </a:t>
+            </a:r>
+            <a:r>
+              <a:rPr lang="en-US" dirty="0"/>
+              <a:t>and natural-language </a:t>
+            </a:r>
+            <a:r>
+              <a:rPr lang="en-US" dirty="0" smtClean="0"/>
+              <a:t>glossary</a:t>
             </a:r>
           </a:p>
           <a:p>
@@ -8941,8 +9011,12 @@
               <a:buChar char="•"/>
             </a:pPr>
             <a:r>
+              <a:rPr lang="en-US" dirty="0" smtClean="0"/>
+              <a:t>Emits </a:t>
+            </a:r>
+            <a:r>
               <a:rPr lang="en-US" dirty="0"/>
-              <a:t>Emits OWL ontologies</a:t>
+              <a:t>OWL ontologies</a:t>
             </a:r>
           </a:p>
           <a:p>
@@ -8952,18 +9026,13 @@
             </a:pPr>
             <a:r>
               <a:rPr lang="en-US" dirty="0"/>
-              <a:t>“Round trips” edited OWL</a:t>
-            </a:r>
-          </a:p>
-          <a:p>
-            <a:pPr marL="285750" indent="-285750">
-              <a:buFont typeface="Arial"/>
-              <a:buChar char="•"/>
-            </a:pPr>
-            <a:r>
-              <a:rPr lang="en-US" dirty="0"/>
-              <a:t>(patterns)</a:t>
-            </a:r>
+              <a:t>“Round trips” edited </a:t>
+            </a:r>
+            <a:r>
+              <a:rPr lang="en-US" dirty="0" smtClean="0"/>
+              <a:t>OWL and “sanctioned” FIBO patterns</a:t>
+            </a:r>
+            <a:endParaRPr lang="en-US" dirty="0"/>
           </a:p>
         </p:txBody>
       </p:sp>
@@ -9064,6 +9133,13 @@
   <p:clrMapOvr>
     <a:masterClrMapping/>
   </p:clrMapOvr>
+  <p:timing>
+    <p:tnLst>
+      <p:par>
+        <p:cTn xmlns:p14="http://schemas.microsoft.com/office/powerpoint/2010/main" id="1" dur="indefinite" restart="never" nodeType="tmRoot"/>
+      </p:par>
+    </p:tnLst>
+  </p:timing>
 </p:sld>
 </file>
 
@@ -9291,6 +9367,13 @@
   <p:clrMapOvr>
     <a:masterClrMapping/>
   </p:clrMapOvr>
+  <p:timing>
+    <p:tnLst>
+      <p:par>
+        <p:cTn xmlns:p14="http://schemas.microsoft.com/office/powerpoint/2010/main" id="1" dur="indefinite" restart="never" nodeType="tmRoot"/>
+      </p:par>
+    </p:tnLst>
+  </p:timing>
 </p:sld>
 </file>
 
@@ -9351,8 +9434,12 @@
               <a:buChar char="•"/>
             </a:pPr>
             <a:r>
+              <a:rPr lang="en-US" dirty="0" smtClean="0"/>
+              <a:t>Discovered </a:t>
+            </a:r>
+            <a:r>
               <a:rPr lang="en-US" dirty="0"/>
-              <a:t>Refinement of the SMIF model</a:t>
+              <a:t>shortcomings in work with the FIBO team</a:t>
             </a:r>
           </a:p>
           <a:p>
@@ -9362,7 +9449,7 @@
             </a:pPr>
             <a:r>
               <a:rPr lang="en-US" dirty="0"/>
-              <a:t>Discovered shortcomings in work with the FIBO team</a:t>
+              <a:t>Valuable experience validating FIBO-V with actual business SMEs</a:t>
             </a:r>
           </a:p>
           <a:p>
@@ -9372,16 +9459,6 @@
             </a:pPr>
             <a:r>
               <a:rPr lang="en-US" dirty="0"/>
-              <a:t>Valuable experience validating FIBO-V with actual business SMEs</a:t>
-            </a:r>
-          </a:p>
-          <a:p>
-            <a:pPr marL="457200" lvl="1" indent="-285750">
-              <a:buFont typeface="Arial"/>
-              <a:buChar char="•"/>
-            </a:pPr>
-            <a:r>
-              <a:rPr lang="en-US" dirty="0"/>
               <a:t>Valuable feedback on profile understandability</a:t>
             </a:r>
           </a:p>
@@ -9392,7 +9469,15 @@
             </a:pPr>
             <a:r>
               <a:rPr lang="en-US" dirty="0"/>
-              <a:t>Stronger formalization and provable grounding of the SMIF kernel</a:t>
+              <a:t>Refinement </a:t>
+            </a:r>
+            <a:r>
+              <a:rPr lang="en-US" dirty="0" smtClean="0"/>
+              <a:t>made to the </a:t>
+            </a:r>
+            <a:r>
+              <a:rPr lang="en-US" dirty="0"/>
+              <a:t>SMIF model</a:t>
             </a:r>
           </a:p>
           <a:p>
@@ -9401,8 +9486,26 @@
               <a:buChar char="•"/>
             </a:pPr>
             <a:r>
+              <a:rPr lang="en-US" dirty="0" smtClean="0"/>
+              <a:t>Need stronger </a:t>
+            </a:r>
+            <a:r>
               <a:rPr lang="en-US" dirty="0"/>
-              <a:t>We plan to exceed the requirements of the OMG process by having multiple implementations on adoption, not one year later</a:t>
+              <a:t>formalization and provable grounding of the SMIF kernel</a:t>
+            </a:r>
+          </a:p>
+          <a:p>
+            <a:pPr marL="285750" indent="-285750">
+              <a:buFont typeface="Arial"/>
+              <a:buChar char="•"/>
+            </a:pPr>
+            <a:r>
+              <a:rPr lang="en-US" dirty="0" smtClean="0"/>
+              <a:t>Plan </a:t>
+            </a:r>
+            <a:r>
+              <a:rPr lang="en-US" dirty="0"/>
+              <a:t>to exceed the requirements of the OMG process by having multiple implementations on adoption, not one year later</a:t>
             </a:r>
           </a:p>
           <a:p>
@@ -9521,6 +9624,13 @@
   <p:clrMapOvr>
     <a:masterClrMapping/>
   </p:clrMapOvr>
+  <p:timing>
+    <p:tnLst>
+      <p:par>
+        <p:cTn xmlns:p14="http://schemas.microsoft.com/office/powerpoint/2010/main" id="1" dur="indefinite" restart="never" nodeType="tmRoot"/>
+      </p:par>
+    </p:tnLst>
+  </p:timing>
 </p:sld>
 </file>
 

</xml_diff>